<commit_message>
modify presentation doc #45
発表した資料ver
</commit_message>
<xml_diff>
--- a/production-idea/決意表明.pptx
+++ b/production-idea/決意表明.pptx
@@ -7,9 +7,11 @@
   <p:sldIdLst>
     <p:sldId id="256" r:id="rId2"/>
     <p:sldId id="257" r:id="rId3"/>
-    <p:sldId id="261" r:id="rId4"/>
-    <p:sldId id="258" r:id="rId5"/>
-    <p:sldId id="262" r:id="rId6"/>
+    <p:sldId id="263" r:id="rId4"/>
+    <p:sldId id="264" r:id="rId5"/>
+    <p:sldId id="261" r:id="rId6"/>
+    <p:sldId id="258" r:id="rId7"/>
+    <p:sldId id="262" r:id="rId8"/>
   </p:sldIdLst>
   <p:sldSz cx="12192000" cy="6858000"/>
   <p:notesSz cx="6858000" cy="9144000"/>
@@ -108,6 +110,11 @@
       </a:defRPr>
     </a:lvl9pPr>
   </p:defaultTextStyle>
+  <p:extLst>
+    <p:ext uri="{EFAFB233-063F-42B5-8137-9DF3F51BA10A}">
+      <p15:sldGuideLst xmlns:p15="http://schemas.microsoft.com/office/powerpoint/2012/main"/>
+    </p:ext>
+  </p:extLst>
 </p:presentation>
 </file>
 
@@ -341,7 +348,7 @@
             <a:fld id="{B61BEF0D-F0BB-DE4B-95CE-6DB70DBA9567}" type="datetimeFigureOut">
               <a:rPr lang="en-US" dirty="0"/>
               <a:pPr/>
-              <a:t>9/23/16</a:t>
+              <a:t>9/23/2016</a:t>
             </a:fld>
             <a:endParaRPr lang="en-US" dirty="0"/>
           </a:p>
@@ -679,7 +686,7 @@
             <a:fld id="{B61BEF0D-F0BB-DE4B-95CE-6DB70DBA9567}" type="datetimeFigureOut">
               <a:rPr lang="en-US" dirty="0"/>
               <a:pPr/>
-              <a:t>9/23/16</a:t>
+              <a:t>9/23/2016</a:t>
             </a:fld>
             <a:endParaRPr lang="en-US" dirty="0"/>
           </a:p>
@@ -954,7 +961,7 @@
             <a:fld id="{B61BEF0D-F0BB-DE4B-95CE-6DB70DBA9567}" type="datetimeFigureOut">
               <a:rPr lang="en-US" dirty="0"/>
               <a:pPr/>
-              <a:t>9/23/16</a:t>
+              <a:t>9/23/2016</a:t>
             </a:fld>
             <a:endParaRPr lang="en-US" dirty="0"/>
           </a:p>
@@ -1519,7 +1526,7 @@
             <a:fld id="{B61BEF0D-F0BB-DE4B-95CE-6DB70DBA9567}" type="datetimeFigureOut">
               <a:rPr lang="en-US" dirty="0"/>
               <a:pPr/>
-              <a:t>9/23/16</a:t>
+              <a:t>9/23/2016</a:t>
             </a:fld>
             <a:endParaRPr lang="en-US" dirty="0"/>
           </a:p>
@@ -1794,7 +1801,7 @@
             <a:fld id="{B61BEF0D-F0BB-DE4B-95CE-6DB70DBA9567}" type="datetimeFigureOut">
               <a:rPr lang="en-US" dirty="0"/>
               <a:pPr/>
-              <a:t>9/23/16</a:t>
+              <a:t>9/23/2016</a:t>
             </a:fld>
             <a:endParaRPr lang="en-US" dirty="0"/>
           </a:p>
@@ -2353,7 +2360,7 @@
             <a:fld id="{B61BEF0D-F0BB-DE4B-95CE-6DB70DBA9567}" type="datetimeFigureOut">
               <a:rPr lang="en-US" dirty="0"/>
               <a:pPr/>
-              <a:t>9/23/16</a:t>
+              <a:t>9/23/2016</a:t>
             </a:fld>
             <a:endParaRPr lang="en-US" dirty="0"/>
           </a:p>
@@ -2677,7 +2684,7 @@
             <a:fld id="{B61BEF0D-F0BB-DE4B-95CE-6DB70DBA9567}" type="datetimeFigureOut">
               <a:rPr lang="en-US" dirty="0"/>
               <a:pPr/>
-              <a:t>9/23/16</a:t>
+              <a:t>9/23/2016</a:t>
             </a:fld>
             <a:endParaRPr lang="en-US" dirty="0"/>
           </a:p>
@@ -2883,7 +2890,7 @@
             <a:fld id="{B61BEF0D-F0BB-DE4B-95CE-6DB70DBA9567}" type="datetimeFigureOut">
               <a:rPr lang="en-US" dirty="0"/>
               <a:pPr/>
-              <a:t>9/23/16</a:t>
+              <a:t>9/23/2016</a:t>
             </a:fld>
             <a:endParaRPr lang="en-US" dirty="0"/>
           </a:p>
@@ -3150,7 +3157,7 @@
             <a:fld id="{B61BEF0D-F0BB-DE4B-95CE-6DB70DBA9567}" type="datetimeFigureOut">
               <a:rPr lang="en-US" dirty="0"/>
               <a:pPr/>
-              <a:t>9/23/16</a:t>
+              <a:t>9/23/2016</a:t>
             </a:fld>
             <a:endParaRPr lang="en-US" dirty="0"/>
           </a:p>
@@ -3379,7 +3386,7 @@
             <a:fld id="{B61BEF0D-F0BB-DE4B-95CE-6DB70DBA9567}" type="datetimeFigureOut">
               <a:rPr lang="en-US" dirty="0"/>
               <a:pPr/>
-              <a:t>9/23/16</a:t>
+              <a:t>9/23/2016</a:t>
             </a:fld>
             <a:endParaRPr lang="en-US" dirty="0"/>
           </a:p>
@@ -3659,7 +3666,7 @@
             <a:fld id="{B61BEF0D-F0BB-DE4B-95CE-6DB70DBA9567}" type="datetimeFigureOut">
               <a:rPr lang="en-US" dirty="0"/>
               <a:pPr/>
-              <a:t>9/23/16</a:t>
+              <a:t>9/23/2016</a:t>
             </a:fld>
             <a:endParaRPr lang="en-US" dirty="0"/>
           </a:p>
@@ -3986,7 +3993,7 @@
             <a:fld id="{B61BEF0D-F0BB-DE4B-95CE-6DB70DBA9567}" type="datetimeFigureOut">
               <a:rPr lang="en-US" dirty="0"/>
               <a:pPr/>
-              <a:t>9/23/16</a:t>
+              <a:t>9/23/2016</a:t>
             </a:fld>
             <a:endParaRPr lang="en-US" dirty="0"/>
           </a:p>
@@ -4421,7 +4428,7 @@
             <a:fld id="{B61BEF0D-F0BB-DE4B-95CE-6DB70DBA9567}" type="datetimeFigureOut">
               <a:rPr lang="en-US" dirty="0"/>
               <a:pPr/>
-              <a:t>9/23/16</a:t>
+              <a:t>9/23/2016</a:t>
             </a:fld>
             <a:endParaRPr lang="en-US" dirty="0"/>
           </a:p>
@@ -4566,7 +4573,7 @@
             <a:fld id="{B61BEF0D-F0BB-DE4B-95CE-6DB70DBA9567}" type="datetimeFigureOut">
               <a:rPr lang="en-US" dirty="0"/>
               <a:pPr/>
-              <a:t>9/23/16</a:t>
+              <a:t>9/23/2016</a:t>
             </a:fld>
             <a:endParaRPr lang="en-US" dirty="0"/>
           </a:p>
@@ -4688,7 +4695,7 @@
             <a:fld id="{B61BEF0D-F0BB-DE4B-95CE-6DB70DBA9567}" type="datetimeFigureOut">
               <a:rPr lang="en-US" dirty="0"/>
               <a:pPr/>
-              <a:t>9/23/16</a:t>
+              <a:t>9/23/2016</a:t>
             </a:fld>
             <a:endParaRPr lang="en-US" dirty="0"/>
           </a:p>
@@ -5002,7 +5009,7 @@
             <a:fld id="{B61BEF0D-F0BB-DE4B-95CE-6DB70DBA9567}" type="datetimeFigureOut">
               <a:rPr lang="en-US" dirty="0"/>
               <a:pPr/>
-              <a:t>9/23/16</a:t>
+              <a:t>9/23/2016</a:t>
             </a:fld>
             <a:endParaRPr lang="en-US" dirty="0"/>
           </a:p>
@@ -5323,7 +5330,7 @@
             <a:fld id="{B61BEF0D-F0BB-DE4B-95CE-6DB70DBA9567}" type="datetimeFigureOut">
               <a:rPr lang="en-US" dirty="0"/>
               <a:pPr/>
-              <a:t>9/23/16</a:t>
+              <a:t>9/23/2016</a:t>
             </a:fld>
             <a:endParaRPr lang="en-US" dirty="0"/>
           </a:p>
@@ -5566,7 +5573,7 @@
             <a:fld id="{B61BEF0D-F0BB-DE4B-95CE-6DB70DBA9567}" type="datetimeFigureOut">
               <a:rPr lang="en-US" dirty="0"/>
               <a:pPr/>
-              <a:t>9/23/16</a:t>
+              <a:t>9/23/2016</a:t>
             </a:fld>
             <a:endParaRPr lang="en-US" dirty="0"/>
           </a:p>
@@ -6108,12 +6115,27 @@
             <p:ph type="subTitle" idx="1"/>
           </p:nvPr>
         </p:nvSpPr>
-        <p:spPr/>
+        <p:spPr>
+          <a:xfrm>
+            <a:off x="3962399" y="4385732"/>
+            <a:ext cx="7197726" cy="2245413"/>
+          </a:xfrm>
+        </p:spPr>
         <p:txBody>
           <a:bodyPr>
-            <a:normAutofit fontScale="92500" lnSpcReduction="10000"/>
+            <a:normAutofit/>
           </a:bodyPr>
           <a:lstStyle/>
+          <a:p>
+            <a:r>
+              <a:rPr kumimoji="1" lang="ja-JP" altLang="en-US" dirty="0" smtClean="0"/>
+              <a:t>チーム</a:t>
+            </a:r>
+            <a:r>
+              <a:rPr kumimoji="1" lang="en-US" altLang="ja-JP" dirty="0" smtClean="0"/>
+              <a:t>F</a:t>
+            </a:r>
+          </a:p>
           <a:p>
             <a:r>
               <a:rPr kumimoji="1" lang="en-US" altLang="ja-JP" dirty="0" smtClean="0"/>
@@ -6221,7 +6243,7 @@
 </file>
 
 <file path=ppt/slides/slide2.xml><?xml version="1.0" encoding="utf-8"?>
-<p:sld xmlns:a="http://schemas.openxmlformats.org/drawingml/2006/main" xmlns:r="http://schemas.openxmlformats.org/officeDocument/2006/relationships" xmlns:p="http://schemas.openxmlformats.org/presentationml/2006/main">
+<p:sld xmlns:a="http://schemas.openxmlformats.org/drawingml/2006/main" xmlns:r="http://schemas.openxmlformats.org/officeDocument/2006/relationships" xmlns:p="http://schemas.openxmlformats.org/presentationml/2006/main" show="0">
   <p:cSld>
     <p:spTree>
       <p:nvGrpSpPr>
@@ -6324,6 +6346,14 @@
   <p:clrMapOvr>
     <a:masterClrMapping/>
   </p:clrMapOvr>
+  <mc:AlternateContent xmlns:mc="http://schemas.openxmlformats.org/markup-compatibility/2006">
+    <mc:Choice xmlns:p14="http://schemas.microsoft.com/office/powerpoint/2010/main" Requires="p14">
+      <p:transition spd="slow" p14:dur="2000"/>
+    </mc:Choice>
+    <mc:Fallback>
+      <p:transition spd="slow"/>
+    </mc:Fallback>
+  </mc:AlternateContent>
   <p:timing>
     <p:tnLst>
       <p:par>
@@ -6361,6 +6391,231 @@
             <p:ph type="title"/>
           </p:nvPr>
         </p:nvSpPr>
+        <p:spPr/>
+        <p:txBody>
+          <a:bodyPr/>
+          <a:lstStyle/>
+          <a:p>
+            <a:pPr algn="ctr"/>
+            <a:r>
+              <a:rPr kumimoji="1" lang="ja-JP" altLang="en-US" dirty="0" smtClean="0"/>
+              <a:t>ブラウザのブックマーク整理してますか？</a:t>
+            </a:r>
+            <a:endParaRPr kumimoji="1" lang="ja-JP" altLang="en-US" dirty="0"/>
+          </a:p>
+        </p:txBody>
+      </p:sp>
+      <p:sp>
+        <p:nvSpPr>
+          <p:cNvPr id="3" name="コンテンツ プレースホルダー 2"/>
+          <p:cNvSpPr>
+            <a:spLocks noGrp="1"/>
+          </p:cNvSpPr>
+          <p:nvPr>
+            <p:ph idx="1"/>
+          </p:nvPr>
+        </p:nvSpPr>
+        <p:spPr/>
+        <p:txBody>
+          <a:bodyPr>
+            <a:normAutofit/>
+          </a:bodyPr>
+          <a:lstStyle/>
+          <a:p>
+            <a:pPr algn="ctr"/>
+            <a:r>
+              <a:rPr kumimoji="1" lang="ja-JP" altLang="en-US" sz="3600" dirty="0" smtClean="0"/>
+              <a:t>整理しておかないとブックマークの価値半減</a:t>
+            </a:r>
+            <a:endParaRPr kumimoji="1" lang="en-US" altLang="ja-JP" sz="3600" dirty="0" smtClean="0"/>
+          </a:p>
+          <a:p>
+            <a:pPr algn="ctr"/>
+            <a:r>
+              <a:rPr kumimoji="1" lang="ja-JP" altLang="en-US" sz="3600" dirty="0" smtClean="0"/>
+              <a:t>フォルダ分けって結構面倒、全部プログラミングってフォルダにいれちゃってぐちゃぐちゃとか・・</a:t>
+            </a:r>
+            <a:endParaRPr kumimoji="1" lang="ja-JP" altLang="en-US" sz="3600" dirty="0"/>
+          </a:p>
+        </p:txBody>
+      </p:sp>
+    </p:spTree>
+    <p:extLst>
+      <p:ext uri="{BB962C8B-B14F-4D97-AF65-F5344CB8AC3E}">
+        <p14:creationId xmlns:p14="http://schemas.microsoft.com/office/powerpoint/2010/main" val="289873822"/>
+      </p:ext>
+    </p:extLst>
+  </p:cSld>
+  <p:clrMapOvr>
+    <a:masterClrMapping/>
+  </p:clrMapOvr>
+  <p:timing>
+    <p:tnLst>
+      <p:par>
+        <p:cTn id="1" dur="indefinite" restart="never" nodeType="tmRoot"/>
+      </p:par>
+    </p:tnLst>
+  </p:timing>
+</p:sld>
+</file>
+
+<file path=ppt/slides/slide4.xml><?xml version="1.0" encoding="utf-8"?>
+<p:sld xmlns:a="http://schemas.openxmlformats.org/drawingml/2006/main" xmlns:r="http://schemas.openxmlformats.org/officeDocument/2006/relationships" xmlns:p="http://schemas.openxmlformats.org/presentationml/2006/main">
+  <p:cSld>
+    <p:spTree>
+      <p:nvGrpSpPr>
+        <p:cNvPr id="1" name=""/>
+        <p:cNvGrpSpPr/>
+        <p:nvPr/>
+      </p:nvGrpSpPr>
+      <p:grpSpPr>
+        <a:xfrm>
+          <a:off x="0" y="0"/>
+          <a:ext cx="0" cy="0"/>
+          <a:chOff x="0" y="0"/>
+          <a:chExt cx="0" cy="0"/>
+        </a:xfrm>
+      </p:grpSpPr>
+      <p:sp>
+        <p:nvSpPr>
+          <p:cNvPr id="2" name="タイトル 1"/>
+          <p:cNvSpPr>
+            <a:spLocks noGrp="1"/>
+          </p:cNvSpPr>
+          <p:nvPr>
+            <p:ph type="title"/>
+          </p:nvPr>
+        </p:nvSpPr>
+        <p:spPr/>
+        <p:txBody>
+          <a:bodyPr/>
+          <a:lstStyle/>
+          <a:p>
+            <a:pPr algn="ctr"/>
+            <a:r>
+              <a:rPr kumimoji="1" lang="ja-JP" altLang="en-US" dirty="0" smtClean="0"/>
+              <a:t>億劫になる原因は</a:t>
+            </a:r>
+            <a:endParaRPr kumimoji="1" lang="ja-JP" altLang="en-US" dirty="0"/>
+          </a:p>
+        </p:txBody>
+      </p:sp>
+      <p:sp>
+        <p:nvSpPr>
+          <p:cNvPr id="3" name="コンテンツ プレースホルダー 2"/>
+          <p:cNvSpPr>
+            <a:spLocks noGrp="1"/>
+          </p:cNvSpPr>
+          <p:nvPr>
+            <p:ph idx="1"/>
+          </p:nvPr>
+        </p:nvSpPr>
+        <p:spPr/>
+        <p:txBody>
+          <a:bodyPr/>
+          <a:lstStyle/>
+          <a:p>
+            <a:r>
+              <a:rPr kumimoji="1" lang="ja-JP" altLang="en-US" sz="3200" dirty="0" smtClean="0"/>
+              <a:t>ブラウザのブックマーク管理機能</a:t>
+            </a:r>
+            <a:endParaRPr kumimoji="1" lang="en-US" altLang="ja-JP" sz="3200" dirty="0" smtClean="0"/>
+          </a:p>
+          <a:p>
+            <a:pPr lvl="2"/>
+            <a:r>
+              <a:rPr kumimoji="1" lang="ja-JP" altLang="en-US" sz="2800" dirty="0" smtClean="0"/>
+              <a:t>機能的に貧弱</a:t>
+            </a:r>
+            <a:endParaRPr kumimoji="1" lang="en-US" altLang="ja-JP" sz="2800" dirty="0" smtClean="0"/>
+          </a:p>
+          <a:p>
+            <a:pPr lvl="2"/>
+            <a:r>
+              <a:rPr kumimoji="1" lang="en-US" altLang="ja-JP" sz="2800" dirty="0" smtClean="0"/>
+              <a:t>UI</a:t>
+            </a:r>
+            <a:r>
+              <a:rPr kumimoji="1" lang="ja-JP" altLang="en-US" sz="2800" dirty="0" smtClean="0"/>
+              <a:t>が使いにくい</a:t>
+            </a:r>
+            <a:endParaRPr kumimoji="1" lang="en-US" altLang="ja-JP" sz="2800" dirty="0" smtClean="0"/>
+          </a:p>
+          <a:p>
+            <a:pPr lvl="2"/>
+            <a:r>
+              <a:rPr kumimoji="1" lang="ja-JP" altLang="en-US" sz="2800" dirty="0" smtClean="0"/>
+              <a:t>増えすぎたブックマークをうまく扱えない</a:t>
+            </a:r>
+            <a:endParaRPr kumimoji="1" lang="en-US" altLang="ja-JP" sz="2800" dirty="0" smtClean="0"/>
+          </a:p>
+          <a:p>
+            <a:r>
+              <a:rPr kumimoji="1" lang="ja-JP" altLang="en-US" sz="3200" dirty="0" smtClean="0">
+                <a:solidFill>
+                  <a:srgbClr val="FF0000"/>
+                </a:solidFill>
+              </a:rPr>
+              <a:t>特に分類するには逐一ページの内容（タイトルとか）を把握してフォルダにまとめていかなければいけない</a:t>
+            </a:r>
+            <a:endParaRPr lang="en-US" altLang="ja-JP" sz="3200" dirty="0" smtClean="0">
+              <a:solidFill>
+                <a:srgbClr val="FF0000"/>
+              </a:solidFill>
+            </a:endParaRPr>
+          </a:p>
+          <a:p>
+            <a:endParaRPr kumimoji="1" lang="en-US" altLang="ja-JP" dirty="0" smtClean="0"/>
+          </a:p>
+        </p:txBody>
+      </p:sp>
+    </p:spTree>
+    <p:extLst>
+      <p:ext uri="{BB962C8B-B14F-4D97-AF65-F5344CB8AC3E}">
+        <p14:creationId xmlns:p14="http://schemas.microsoft.com/office/powerpoint/2010/main" val="2190585552"/>
+      </p:ext>
+    </p:extLst>
+  </p:cSld>
+  <p:clrMapOvr>
+    <a:masterClrMapping/>
+  </p:clrMapOvr>
+  <p:timing>
+    <p:tnLst>
+      <p:par>
+        <p:cTn id="1" dur="indefinite" restart="never" nodeType="tmRoot"/>
+      </p:par>
+    </p:tnLst>
+  </p:timing>
+</p:sld>
+</file>
+
+<file path=ppt/slides/slide5.xml><?xml version="1.0" encoding="utf-8"?>
+<p:sld xmlns:a="http://schemas.openxmlformats.org/drawingml/2006/main" xmlns:r="http://schemas.openxmlformats.org/officeDocument/2006/relationships" xmlns:p="http://schemas.openxmlformats.org/presentationml/2006/main">
+  <p:cSld>
+    <p:spTree>
+      <p:nvGrpSpPr>
+        <p:cNvPr id="1" name=""/>
+        <p:cNvGrpSpPr/>
+        <p:nvPr/>
+      </p:nvGrpSpPr>
+      <p:grpSpPr>
+        <a:xfrm>
+          <a:off x="0" y="0"/>
+          <a:ext cx="0" cy="0"/>
+          <a:chOff x="0" y="0"/>
+          <a:chExt cx="0" cy="0"/>
+        </a:xfrm>
+      </p:grpSpPr>
+      <p:sp>
+        <p:nvSpPr>
+          <p:cNvPr id="2" name="タイトル 1"/>
+          <p:cNvSpPr>
+            <a:spLocks noGrp="1"/>
+          </p:cNvSpPr>
+          <p:nvPr>
+            <p:ph type="title"/>
+          </p:nvPr>
+        </p:nvSpPr>
         <p:spPr>
           <a:xfrm>
             <a:off x="1030288" y="609600"/>
@@ -6373,8 +6628,12 @@
           <a:p>
             <a:pPr algn="ctr"/>
             <a:r>
+              <a:rPr lang="ja-JP" altLang="en-US" dirty="0" smtClean="0"/>
+              <a:t>そこでブックマーク</a:t>
+            </a:r>
+            <a:r>
               <a:rPr lang="ja-JP" altLang="en-US" dirty="0"/>
-              <a:t>ブックマークを簡単に整理できる</a:t>
+              <a:t>を簡単に整理できる</a:t>
             </a:r>
             <a:r>
               <a:rPr lang="ja-JP" altLang="en-US" dirty="0" smtClean="0"/>
@@ -6448,7 +6707,7 @@
 </p:sld>
 </file>
 
-<file path=ppt/slides/slide4.xml><?xml version="1.0" encoding="utf-8"?>
+<file path=ppt/slides/slide6.xml><?xml version="1.0" encoding="utf-8"?>
 <p:sld xmlns:a="http://schemas.openxmlformats.org/drawingml/2006/main" xmlns:r="http://schemas.openxmlformats.org/officeDocument/2006/relationships" xmlns:p="http://schemas.openxmlformats.org/presentationml/2006/main">
   <p:cSld>
     <p:spTree>
@@ -6554,7 +6813,7 @@
 </p:sld>
 </file>
 
-<file path=ppt/slides/slide5.xml><?xml version="1.0" encoding="utf-8"?>
+<file path=ppt/slides/slide7.xml><?xml version="1.0" encoding="utf-8"?>
 <p:sld xmlns:a="http://schemas.openxmlformats.org/drawingml/2006/main" xmlns:r="http://schemas.openxmlformats.org/officeDocument/2006/relationships" xmlns:p="http://schemas.openxmlformats.org/presentationml/2006/main">
   <p:cSld>
     <p:spTree>
@@ -6612,22 +6871,47 @@
         </p:spPr>
         <p:txBody>
           <a:bodyPr>
-            <a:normAutofit/>
+            <a:normAutofit fontScale="92500" lnSpcReduction="10000"/>
           </a:bodyPr>
           <a:lstStyle/>
           <a:p>
             <a:r>
               <a:rPr kumimoji="1" lang="ja-JP" altLang="en-US" sz="3600" dirty="0" smtClean="0"/>
-              <a:t>ブックマークをフォルダ分け出来ていない人</a:t>
+              <a:t>ブラウザの標準</a:t>
+            </a:r>
+            <a:r>
+              <a:rPr kumimoji="1" lang="en-US" altLang="ja-JP" sz="3600" dirty="0" smtClean="0"/>
+              <a:t>BM</a:t>
+            </a:r>
+            <a:r>
+              <a:rPr kumimoji="1" lang="ja-JP" altLang="en-US" sz="3600" dirty="0" smtClean="0"/>
+              <a:t>システムを利用しており</a:t>
             </a:r>
             <a:endParaRPr kumimoji="1" lang="en-US" altLang="ja-JP" sz="3600" dirty="0" smtClean="0"/>
           </a:p>
           <a:p>
-            <a:r>
-              <a:rPr lang="ja-JP" altLang="en-US" sz="3600" dirty="0" smtClean="0"/>
-              <a:t>ブックマークの整理をするのが面倒な人</a:t>
-            </a:r>
-            <a:endParaRPr lang="en-US" altLang="ja-JP" sz="3600" dirty="0" smtClean="0"/>
+            <a:pPr lvl="1"/>
+            <a:r>
+              <a:rPr kumimoji="1" lang="ja-JP" altLang="en-US" sz="3400" dirty="0" smtClean="0"/>
+              <a:t>ブックマーク</a:t>
+            </a:r>
+            <a:r>
+              <a:rPr kumimoji="1" lang="ja-JP" altLang="en-US" sz="3400" dirty="0" smtClean="0"/>
+              <a:t>をフォルダ分け出来ていない人</a:t>
+            </a:r>
+            <a:endParaRPr kumimoji="1" lang="en-US" altLang="ja-JP" sz="3400" dirty="0" smtClean="0"/>
+          </a:p>
+          <a:p>
+            <a:pPr lvl="1"/>
+            <a:r>
+              <a:rPr lang="ja-JP" altLang="en-US" sz="3400" dirty="0" smtClean="0"/>
+              <a:t>ブックマークの整理をするのが面倒な</a:t>
+            </a:r>
+            <a:r>
+              <a:rPr lang="ja-JP" altLang="en-US" sz="3400" dirty="0" smtClean="0"/>
+              <a:t>人</a:t>
+            </a:r>
+            <a:endParaRPr lang="en-US" altLang="ja-JP" sz="3400" dirty="0" smtClean="0"/>
           </a:p>
         </p:txBody>
       </p:sp>

</xml_diff>